<commit_message>
revised .ppt for python wk3.2
</commit_message>
<xml_diff>
--- a/Power Points/Python2.pptx
+++ b/Power Points/Python2.pptx
@@ -235,7 +235,7 @@
           <a:p>
             <a:fld id="{51A969EA-8566-418D-AC96-BC5F6E9FAB6C}" type="datetimeFigureOut">
               <a:rPr lang="en-US" smtClean="0"/>
-              <a:t>11/24/18</a:t>
+              <a:t>11/27/18</a:t>
             </a:fld>
             <a:endParaRPr lang="en-US"/>
           </a:p>
@@ -400,7 +400,7 @@
           <a:p>
             <a:fld id="{33B07B4B-74D8-4C42-A719-1F93879497F8}" type="datetimeFigureOut">
               <a:rPr lang="en-US" smtClean="0"/>
-              <a:t>11/24/18</a:t>
+              <a:t>11/27/18</a:t>
             </a:fld>
             <a:endParaRPr lang="en-US"/>
           </a:p>
@@ -2295,7 +2295,7 @@
           <a:p>
             <a:fld id="{B65C9255-9F07-4181-9AD2-897FFC0A3B7E}" type="datetimeFigureOut">
               <a:rPr lang="en-US" smtClean="0"/>
-              <a:t>11/24/18</a:t>
+              <a:t>11/27/18</a:t>
             </a:fld>
             <a:endParaRPr lang="en-US"/>
           </a:p>
@@ -2497,7 +2497,7 @@
           <a:p>
             <a:fld id="{B65C9255-9F07-4181-9AD2-897FFC0A3B7E}" type="datetimeFigureOut">
               <a:rPr lang="en-US" smtClean="0"/>
-              <a:t>11/24/18</a:t>
+              <a:t>11/27/18</a:t>
             </a:fld>
             <a:endParaRPr lang="en-US"/>
           </a:p>
@@ -2720,7 +2720,7 @@
           <a:p>
             <a:fld id="{B65C9255-9F07-4181-9AD2-897FFC0A3B7E}" type="datetimeFigureOut">
               <a:rPr lang="en-US" smtClean="0"/>
-              <a:t>11/24/18</a:t>
+              <a:t>11/27/18</a:t>
             </a:fld>
             <a:endParaRPr lang="en-US"/>
           </a:p>
@@ -5932,8 +5932,8 @@
         </p:nvSpPr>
         <p:spPr>
           <a:xfrm>
-            <a:off x="304800" y="914400"/>
-            <a:ext cx="4114800" cy="5724644"/>
+            <a:off x="304800" y="685800"/>
+            <a:ext cx="4114800" cy="5878532"/>
           </a:xfrm>
           <a:prstGeom prst="rect">
             <a:avLst/>
@@ -6116,7 +6116,7 @@
             </a:r>
           </a:p>
           <a:p>
-            <a:endParaRPr lang="en-US" sz="2400"/>
+            <a:endParaRPr lang="en-US" sz="1400"/>
           </a:p>
           <a:p>
             <a:r>
@@ -6194,7 +6194,17 @@
                   <a:srgbClr val="FF0000"/>
                 </a:solidFill>
               </a:rPr>
-              <a:t>** up to 5 but not including 5</a:t>
+              <a:t>** up to 5 (upper bound) but no</a:t>
+            </a:r>
+          </a:p>
+          <a:p>
+            <a:r>
+              <a:rPr lang="en-US">
+                <a:solidFill>
+                  <a:srgbClr val="FF0000"/>
+                </a:solidFill>
+              </a:rPr>
+              <a:t>    including 5</a:t>
             </a:r>
           </a:p>
         </p:txBody>
@@ -6213,7 +6223,7 @@
         </p:nvSpPr>
         <p:spPr>
           <a:xfrm>
-            <a:off x="4419599" y="905249"/>
+            <a:off x="4419599" y="685800"/>
             <a:ext cx="4571997" cy="5016758"/>
           </a:xfrm>
           <a:prstGeom prst="rect">
@@ -6257,7 +6267,7 @@
                   </a:schemeClr>
                 </a:solidFill>
               </a:rPr>
-              <a:t>for</a:t>
+              <a:t>For</a:t>
             </a:r>
             <a:r>
               <a:rPr lang="en-US" sz="2400"/>
@@ -6315,7 +6325,7 @@
                   </a:schemeClr>
                 </a:solidFill>
               </a:rPr>
-              <a:t>for</a:t>
+              <a:t>For</a:t>
             </a:r>
             <a:r>
               <a:rPr lang="en-US" sz="2400"/>
@@ -6343,7 +6353,7 @@
             </a:r>
           </a:p>
           <a:p>
-            <a:endParaRPr lang="en-US" sz="2400"/>
+            <a:endParaRPr lang="en-US" sz="1400"/>
           </a:p>
           <a:p>
             <a:endParaRPr lang="en-US" sz="2000" b="1">

</xml_diff>

<commit_message>
added lecture notes for python wk3.2
</commit_message>
<xml_diff>
--- a/Power Points/Python2.pptx
+++ b/Power Points/Python2.pptx
@@ -3962,7 +3962,7 @@
             </a:r>
             <a:r>
               <a:rPr lang="it" sz="2400"/>
-              <a:t> = [0, 0, 0, 0, 0, 0, 0, 0, 0, 0]</a:t>
+              <a:t> = [0, 3, 0, 0, 2, 0, 0, 0, 0, 0]</a:t>
             </a:r>
           </a:p>
           <a:p>
@@ -4393,7 +4393,7 @@
               <a:rPr lang="en-US" sz="2400" b="0">
                 <a:effectLst/>
               </a:rPr>
-              <a:t>. It will not be removed from memory and recognized outsides of this block of code.</a:t>
+              <a:t>. It will be removed from memory and not recognized outsides of this block of code.</a:t>
             </a:r>
           </a:p>
           <a:p>
@@ -6533,7 +6533,7 @@
         <p:spPr>
           <a:xfrm>
             <a:off x="381000" y="914400"/>
-            <a:ext cx="8229600" cy="4770537"/>
+            <a:ext cx="8229600" cy="4955203"/>
           </a:xfrm>
           <a:prstGeom prst="rect">
             <a:avLst/>
@@ -6610,42 +6610,42 @@
           <a:p>
             <a:pPr lvl="1"/>
             <a:r>
-              <a:rPr lang="en-US"/>
+              <a:rPr lang="en-US" sz="2000"/>
               <a:t>Ouptut:</a:t>
             </a:r>
           </a:p>
           <a:p>
             <a:pPr lvl="1"/>
             <a:r>
-              <a:rPr lang="en-US"/>
+              <a:rPr lang="en-US" sz="2000"/>
               <a:t>0</a:t>
             </a:r>
           </a:p>
           <a:p>
             <a:pPr lvl="1"/>
             <a:r>
-              <a:rPr lang="en-US"/>
+              <a:rPr lang="en-US" sz="2000"/>
               <a:t>2</a:t>
             </a:r>
           </a:p>
           <a:p>
             <a:pPr lvl="1"/>
             <a:r>
-              <a:rPr lang="en-US"/>
+              <a:rPr lang="en-US" sz="2000"/>
               <a:t>4</a:t>
             </a:r>
           </a:p>
           <a:p>
             <a:pPr lvl="1"/>
             <a:r>
-              <a:rPr lang="en-US"/>
+              <a:rPr lang="en-US" sz="2000"/>
               <a:t>6</a:t>
             </a:r>
           </a:p>
           <a:p>
             <a:pPr lvl="1"/>
             <a:r>
-              <a:rPr lang="en-US"/>
+              <a:rPr lang="en-US" sz="2000"/>
               <a:t>8</a:t>
             </a:r>
           </a:p>
@@ -6657,7 +6657,15 @@
             <a:pPr lvl="1"/>
             <a:r>
               <a:rPr lang="en-US" sz="2400"/>
-              <a:t>print x in increment of 2 up to 10 but exclude 10</a:t>
+              <a:t>print </a:t>
+            </a:r>
+            <a:r>
+              <a:rPr lang="en-US" sz="2400" b="1"/>
+              <a:t>x</a:t>
+            </a:r>
+            <a:r>
+              <a:rPr lang="en-US" sz="2400"/>
+              <a:t> in increment of 2 up to 10 but exclude 10</a:t>
             </a:r>
           </a:p>
           <a:p>
@@ -6758,7 +6766,7 @@
         <p:spPr>
           <a:xfrm>
             <a:off x="381000" y="914400"/>
-            <a:ext cx="8229600" cy="4770537"/>
+            <a:ext cx="8229600" cy="4955203"/>
           </a:xfrm>
           <a:prstGeom prst="rect">
             <a:avLst/>
@@ -6835,42 +6843,42 @@
           <a:p>
             <a:pPr lvl="1"/>
             <a:r>
-              <a:rPr lang="en-US"/>
+              <a:rPr lang="en-US" sz="2000"/>
               <a:t>Ouptut:</a:t>
             </a:r>
           </a:p>
           <a:p>
             <a:pPr lvl="1"/>
             <a:r>
-              <a:rPr lang="en-US"/>
+              <a:rPr lang="en-US" sz="2000"/>
               <a:t>10</a:t>
             </a:r>
           </a:p>
           <a:p>
             <a:pPr lvl="1"/>
             <a:r>
-              <a:rPr lang="en-US"/>
+              <a:rPr lang="en-US" sz="2000"/>
               <a:t>8</a:t>
             </a:r>
           </a:p>
           <a:p>
             <a:pPr lvl="1"/>
             <a:r>
-              <a:rPr lang="en-US"/>
+              <a:rPr lang="en-US" sz="2000"/>
               <a:t>6</a:t>
             </a:r>
           </a:p>
           <a:p>
             <a:pPr lvl="1"/>
             <a:r>
-              <a:rPr lang="en-US"/>
+              <a:rPr lang="en-US" sz="2000"/>
               <a:t>4</a:t>
             </a:r>
           </a:p>
           <a:p>
             <a:pPr lvl="1"/>
             <a:r>
-              <a:rPr lang="en-US"/>
+              <a:rPr lang="en-US" sz="2000"/>
               <a:t>2</a:t>
             </a:r>
           </a:p>

</xml_diff>